<commit_message>
udpates to ML demo
</commit_message>
<xml_diff>
--- a/R/examples/MLdemo/MLPre-demo.pptx
+++ b/R/examples/MLdemo/MLPre-demo.pptx
@@ -5503,11 +5503,17 @@
         <p:nvGraphicFramePr>
           <p:cNvPr id="93" name="Table 93"/>
           <p:cNvGraphicFramePr/>
-          <p:nvPr/>
+          <p:nvPr>
+            <p:extLst>
+              <p:ext uri="{D42A27DB-BD31-4B8C-83A1-F6EECF244321}">
+                <p14:modId xmlns:p14="http://schemas.microsoft.com/office/powerpoint/2010/main" val="4099876560"/>
+              </p:ext>
+            </p:extLst>
+          </p:nvPr>
         </p:nvGraphicFramePr>
         <p:xfrm>
-          <a:off x="940380" y="2768600"/>
-          <a:ext cx="7259013" cy="2621552"/>
+          <a:off x="940380" y="2094045"/>
+          <a:ext cx="7259013" cy="3844744"/>
         </p:xfrm>
         <a:graphic>
           <a:graphicData uri="http://schemas.openxmlformats.org/drawingml/2006/table">
@@ -5520,7 +5526,7 @@
                 <a:gridCol w="2419671"/>
                 <a:gridCol w="2419671"/>
               </a:tblGrid>
-              <a:tr h="635136">
+              <a:tr h="770280">
                 <a:tc>
                   <a:txBody>
                     <a:bodyPr/>
@@ -5554,7 +5560,7 @@
                         </a:defRPr>
                       </a:pPr>
                       <a:r>
-                        <a:rPr b="1" i="1">
+                        <a:rPr lang="en-US" b="1" i="1" dirty="0" smtClean="0">
                           <a:solidFill>
                             <a:srgbClr val="FFFFFF"/>
                           </a:solidFill>
@@ -5564,8 +5570,18 @@
                             </a:solidFill>
                           </a:uFill>
                         </a:rPr>
-                        <a:t>ANQI</a:t>
+                        <a:t>GBM</a:t>
                       </a:r>
+                      <a:endParaRPr b="1" i="1" dirty="0">
+                        <a:solidFill>
+                          <a:srgbClr val="FFFFFF"/>
+                        </a:solidFill>
+                        <a:uFill>
+                          <a:solidFill>
+                            <a:srgbClr val="FFFFFF"/>
+                          </a:solidFill>
+                        </a:uFill>
+                      </a:endParaRPr>
                     </a:p>
                   </a:txBody>
                   <a:tcPr marL="63500" marR="63500" marT="63500" marB="63500" horzOverflow="overflow"/>
@@ -5584,7 +5600,7 @@
                         </a:defRPr>
                       </a:pPr>
                       <a:r>
-                        <a:rPr b="1" i="1">
+                        <a:rPr lang="en-US" b="1" i="1" dirty="0" smtClean="0">
                           <a:solidFill>
                             <a:srgbClr val="FFFFFF"/>
                           </a:solidFill>
@@ -5594,14 +5610,24 @@
                             </a:solidFill>
                           </a:uFill>
                         </a:rPr>
-                        <a:t>IRENE</a:t>
+                        <a:t>GLM</a:t>
                       </a:r>
+                      <a:endParaRPr b="1" i="1" dirty="0">
+                        <a:solidFill>
+                          <a:srgbClr val="FFFFFF"/>
+                        </a:solidFill>
+                        <a:uFill>
+                          <a:solidFill>
+                            <a:srgbClr val="FFFFFF"/>
+                          </a:solidFill>
+                        </a:uFill>
+                      </a:endParaRPr>
                     </a:p>
                   </a:txBody>
                   <a:tcPr marL="63500" marR="63500" marT="63500" marB="63500" horzOverflow="overflow"/>
                 </a:tc>
               </a:tr>
-              <a:tr h="635136">
+              <a:tr h="1152092">
                 <a:tc>
                   <a:txBody>
                     <a:bodyPr/>
@@ -5616,7 +5642,7 @@
                         </a:defRPr>
                       </a:pPr>
                       <a:r>
-                        <a:rPr b="1" i="1">
+                        <a:rPr b="1" i="1" dirty="0">
                           <a:solidFill>
                             <a:srgbClr val="1F2426"/>
                           </a:solidFill>
@@ -5626,7 +5652,59 @@
                             </a:solidFill>
                           </a:uFill>
                         </a:rPr>
-                        <a:t>Error on Dislike (0)
+                        <a:t>Error on </a:t>
+                      </a:r>
+                      <a:r>
+                        <a:rPr b="1" i="1" dirty="0" smtClean="0">
+                          <a:solidFill>
+                            <a:srgbClr val="1F2426"/>
+                          </a:solidFill>
+                          <a:uFill>
+                            <a:solidFill>
+                              <a:srgbClr val="1F2426"/>
+                            </a:solidFill>
+                          </a:uFill>
+                        </a:rPr>
+                        <a:t>Dislike</a:t>
+                      </a:r>
+                      <a:r>
+                        <a:rPr lang="en-US" b="1" i="1" dirty="0" smtClean="0">
+                          <a:solidFill>
+                            <a:srgbClr val="1F2426"/>
+                          </a:solidFill>
+                          <a:uFill>
+                            <a:solidFill>
+                              <a:srgbClr val="1F2426"/>
+                            </a:solidFill>
+                          </a:uFill>
+                        </a:rPr>
+                        <a:t> Class</a:t>
+                      </a:r>
+                      <a:r>
+                        <a:rPr b="1" i="1" dirty="0" smtClean="0">
+                          <a:solidFill>
+                            <a:srgbClr val="1F2426"/>
+                          </a:solidFill>
+                          <a:uFill>
+                            <a:solidFill>
+                              <a:srgbClr val="1F2426"/>
+                            </a:solidFill>
+                          </a:uFill>
+                        </a:rPr>
+                        <a:t> </a:t>
+                      </a:r>
+                      <a:r>
+                        <a:rPr b="1" i="1" dirty="0">
+                          <a:solidFill>
+                            <a:srgbClr val="1F2426"/>
+                          </a:solidFill>
+                          <a:uFill>
+                            <a:solidFill>
+                              <a:srgbClr val="1F2426"/>
+                            </a:solidFill>
+                          </a:uFill>
+                        </a:rPr>
+                        <a:t>(0)
 </a:t>
                       </a:r>
                     </a:p>
@@ -5694,7 +5772,7 @@
                   <a:tcPr marL="63500" marR="63500" marT="63500" marB="63500" horzOverflow="overflow"/>
                 </a:tc>
               </a:tr>
-              <a:tr h="635136">
+              <a:tr h="1152092">
                 <a:tc>
                   <a:txBody>
                     <a:bodyPr/>
@@ -5709,7 +5787,7 @@
                         </a:defRPr>
                       </a:pPr>
                       <a:r>
-                        <a:rPr b="1" i="1">
+                        <a:rPr b="1" i="1" dirty="0">
                           <a:solidFill>
                             <a:srgbClr val="1F2426"/>
                           </a:solidFill>
@@ -5719,7 +5797,59 @@
                             </a:solidFill>
                           </a:uFill>
                         </a:rPr>
-                        <a:t>Error on Like (1)
+                        <a:t>Error on </a:t>
+                      </a:r>
+                      <a:r>
+                        <a:rPr b="1" i="1" dirty="0" smtClean="0">
+                          <a:solidFill>
+                            <a:srgbClr val="1F2426"/>
+                          </a:solidFill>
+                          <a:uFill>
+                            <a:solidFill>
+                              <a:srgbClr val="1F2426"/>
+                            </a:solidFill>
+                          </a:uFill>
+                        </a:rPr>
+                        <a:t>Like</a:t>
+                      </a:r>
+                      <a:r>
+                        <a:rPr lang="en-US" b="1" i="1" dirty="0" smtClean="0">
+                          <a:solidFill>
+                            <a:srgbClr val="1F2426"/>
+                          </a:solidFill>
+                          <a:uFill>
+                            <a:solidFill>
+                              <a:srgbClr val="1F2426"/>
+                            </a:solidFill>
+                          </a:uFill>
+                        </a:rPr>
+                        <a:t> Class</a:t>
+                      </a:r>
+                      <a:r>
+                        <a:rPr b="1" i="1" dirty="0" smtClean="0">
+                          <a:solidFill>
+                            <a:srgbClr val="1F2426"/>
+                          </a:solidFill>
+                          <a:uFill>
+                            <a:solidFill>
+                              <a:srgbClr val="1F2426"/>
+                            </a:solidFill>
+                          </a:uFill>
+                        </a:rPr>
+                        <a:t> </a:t>
+                      </a:r>
+                      <a:r>
+                        <a:rPr b="1" i="1" dirty="0">
+                          <a:solidFill>
+                            <a:srgbClr val="1F2426"/>
+                          </a:solidFill>
+                          <a:uFill>
+                            <a:solidFill>
+                              <a:srgbClr val="1F2426"/>
+                            </a:solidFill>
+                          </a:uFill>
+                        </a:rPr>
+                        <a:t>(1)
 </a:t>
                       </a:r>
                     </a:p>
@@ -5787,7 +5917,7 @@
                   <a:tcPr marL="63500" marR="63500" marT="63500" marB="63500" horzOverflow="overflow"/>
                 </a:tc>
               </a:tr>
-              <a:tr h="635136">
+              <a:tr h="770280">
                 <a:tc>
                   <a:txBody>
                     <a:bodyPr/>
@@ -5862,7 +5992,7 @@
                         </a:defRPr>
                       </a:pPr>
                       <a:r>
-                        <a:rPr b="1" i="1">
+                        <a:rPr b="1" i="1" dirty="0">
                           <a:solidFill>
                             <a:srgbClr val="1F2426"/>
                           </a:solidFill>
@@ -7744,7 +7874,7 @@
                 <a:uFillTx/>
               </a:defRPr>
             </a:pPr>
-            <a:endParaRPr sz="2352">
+            <a:endParaRPr sz="2352" dirty="0">
               <a:solidFill>
                 <a:srgbClr val="535C62"/>
               </a:solidFill>
@@ -7768,7 +7898,7 @@
               </a:defRPr>
             </a:pPr>
             <a:r>
-              <a:rPr sz="2352">
+              <a:rPr sz="2352" dirty="0">
                 <a:solidFill>
                   <a:srgbClr val="535C62"/>
                 </a:solidFill>
@@ -7793,7 +7923,7 @@
                 <a:uFillTx/>
               </a:defRPr>
             </a:pPr>
-            <a:endParaRPr sz="2352">
+            <a:endParaRPr sz="2352" dirty="0">
               <a:solidFill>
                 <a:srgbClr val="535C62"/>
               </a:solidFill>
@@ -7817,7 +7947,7 @@
               </a:defRPr>
             </a:pPr>
             <a:r>
-              <a:rPr sz="2352">
+              <a:rPr sz="2352" dirty="0">
                 <a:solidFill>
                   <a:srgbClr val="535C62"/>
                 </a:solidFill>
@@ -7842,7 +7972,7 @@
                 <a:uFillTx/>
               </a:defRPr>
             </a:pPr>
-            <a:endParaRPr sz="2352">
+            <a:endParaRPr sz="2352" dirty="0">
               <a:solidFill>
                 <a:srgbClr val="535C62"/>
               </a:solidFill>
@@ -7866,7 +7996,7 @@
               </a:defRPr>
             </a:pPr>
             <a:r>
-              <a:rPr sz="2352">
+              <a:rPr sz="2352" dirty="0">
                 <a:solidFill>
                   <a:srgbClr val="535C62"/>
                 </a:solidFill>
@@ -7891,7 +8021,7 @@
                 <a:uFillTx/>
               </a:defRPr>
             </a:pPr>
-            <a:endParaRPr sz="2352">
+            <a:endParaRPr sz="2352" dirty="0">
               <a:solidFill>
                 <a:srgbClr val="535C62"/>
               </a:solidFill>
@@ -9350,7 +9480,7 @@
               </a:defRPr>
             </a:pPr>
             <a:r>
-              <a:rPr sz="2077">
+              <a:rPr sz="2077" dirty="0">
                 <a:uFill>
                   <a:solidFill>
                     <a:srgbClr val="535C62"/>
@@ -9372,7 +9502,7 @@
                 <a:uFillTx/>
               </a:defRPr>
             </a:pPr>
-            <a:endParaRPr sz="2077">
+            <a:endParaRPr sz="2077" dirty="0">
               <a:uFill>
                 <a:solidFill>
                   <a:srgbClr val="535C62"/>
@@ -9393,14 +9523,34 @@
               </a:defRPr>
             </a:pPr>
             <a:r>
-              <a:rPr sz="2077">
+              <a:rPr lang="en-US" sz="2077" dirty="0" smtClean="0">
                 <a:uFill>
                   <a:solidFill>
                     <a:srgbClr val="535C62"/>
                   </a:solidFill>
                 </a:uFill>
               </a:rPr>
-              <a:t>Anqi modeled with tree based GBM - start simple and let the model get as complex as it needs to with depth</a:t>
+              <a:t>Irene </a:t>
+            </a:r>
+            <a:r>
+              <a:rPr sz="2077" dirty="0" smtClean="0">
+                <a:uFill>
+                  <a:solidFill>
+                    <a:srgbClr val="535C62"/>
+                  </a:solidFill>
+                </a:uFill>
+              </a:rPr>
+              <a:t>modeled </a:t>
+            </a:r>
+            <a:r>
+              <a:rPr sz="2077" dirty="0">
+                <a:uFill>
+                  <a:solidFill>
+                    <a:srgbClr val="535C62"/>
+                  </a:solidFill>
+                </a:uFill>
+              </a:rPr>
+              <a:t>with tree based GBM - start simple and let the model get as complex as it needs to with depth</a:t>
             </a:r>
           </a:p>
           <a:p>
@@ -9415,7 +9565,7 @@
                 <a:uFillTx/>
               </a:defRPr>
             </a:pPr>
-            <a:endParaRPr sz="2077">
+            <a:endParaRPr sz="2077" dirty="0">
               <a:uFill>
                 <a:solidFill>
                   <a:srgbClr val="535C62"/>
@@ -9436,14 +9586,44 @@
               </a:defRPr>
             </a:pPr>
             <a:r>
-              <a:rPr sz="2077">
+              <a:rPr lang="en-US" sz="2077" dirty="0" err="1" smtClean="0">
                 <a:uFill>
                   <a:solidFill>
                     <a:srgbClr val="535C62"/>
                   </a:solidFill>
                 </a:uFill>
               </a:rPr>
-              <a:t>Irene modeled with regularized GLM  - start with complexity </a:t>
+              <a:t>Anqi</a:t>
+            </a:r>
+            <a:r>
+              <a:rPr lang="en-US" sz="2077" dirty="0" smtClean="0">
+                <a:uFill>
+                  <a:solidFill>
+                    <a:srgbClr val="535C62"/>
+                  </a:solidFill>
+                </a:uFill>
+              </a:rPr>
+              <a:t> </a:t>
+            </a:r>
+            <a:r>
+              <a:rPr sz="2077" dirty="0" smtClean="0">
+                <a:uFill>
+                  <a:solidFill>
+                    <a:srgbClr val="535C62"/>
+                  </a:solidFill>
+                </a:uFill>
+              </a:rPr>
+              <a:t>modeled </a:t>
+            </a:r>
+            <a:r>
+              <a:rPr sz="2077" dirty="0">
+                <a:uFill>
+                  <a:solidFill>
+                    <a:srgbClr val="535C62"/>
+                  </a:solidFill>
+                </a:uFill>
+              </a:rPr>
+              <a:t>with regularized GLM  - start with complexity </a:t>
             </a:r>
           </a:p>
           <a:p>
@@ -9459,7 +9639,7 @@
               </a:defRPr>
             </a:pPr>
             <a:r>
-              <a:rPr sz="2077">
+              <a:rPr sz="2077" dirty="0">
                 <a:uFill>
                   <a:solidFill>
                     <a:srgbClr val="535C62"/>
@@ -9481,7 +9661,7 @@
                 <a:uFillTx/>
               </a:defRPr>
             </a:pPr>
-            <a:endParaRPr sz="2613">
+            <a:endParaRPr sz="2613" dirty="0">
               <a:solidFill>
                 <a:srgbClr val="535C62"/>
               </a:solidFill>
@@ -9504,7 +9684,7 @@
                 <a:uFillTx/>
               </a:defRPr>
             </a:pPr>
-            <a:endParaRPr sz="1608">
+            <a:endParaRPr sz="1608" dirty="0">
               <a:solidFill>
                 <a:srgbClr val="535C62"/>
               </a:solidFill>
@@ -9527,7 +9707,7 @@
                 <a:uFillTx/>
               </a:defRPr>
             </a:pPr>
-            <a:endParaRPr sz="1608">
+            <a:endParaRPr sz="1608" dirty="0">
               <a:solidFill>
                 <a:srgbClr val="535C62"/>
               </a:solidFill>
@@ -9550,7 +9730,7 @@
                 <a:uFillTx/>
               </a:defRPr>
             </a:pPr>
-            <a:endParaRPr sz="1608">
+            <a:endParaRPr sz="1608" dirty="0">
               <a:solidFill>
                 <a:srgbClr val="535C62"/>
               </a:solidFill>

</xml_diff>